<commit_message>
my takes of the presentation
</commit_message>
<xml_diff>
--- a/reports/TeamLab-presentation.pptx
+++ b/reports/TeamLab-presentation.pptx
@@ -26345,8 +26345,8 @@
           <a:chExt cx="0" cy="0"/>
         </a:xfrm>
       </p:grpSpPr>
-      <mc:AlternateContent xmlns:mc="http://schemas.openxmlformats.org/markup-compatibility/2006">
-        <mc:Choice xmlns:a14="http://schemas.microsoft.com/office/drawing/2010/main" Requires="a14">
+      <mc:AlternateContent xmlns:mc="http://schemas.openxmlformats.org/markup-compatibility/2006" xmlns:a14="http://schemas.microsoft.com/office/drawing/2010/main">
+        <mc:Choice Requires="a14">
           <p:sp>
             <p:nvSpPr>
               <p:cNvPr id="4" name="Inhaltsplatzhalter 3">
@@ -26755,7 +26755,7 @@
             </p:txBody>
           </p:sp>
         </mc:Choice>
-        <mc:Fallback>
+        <mc:Fallback xmlns="">
           <p:sp>
             <p:nvSpPr>
               <p:cNvPr id="4" name="Inhaltsplatzhalter 3">
@@ -26932,8 +26932,8 @@
           </a:p>
         </p:txBody>
       </p:sp>
-      <mc:AlternateContent xmlns:mc="http://schemas.openxmlformats.org/markup-compatibility/2006">
-        <mc:Choice xmlns:a14="http://schemas.microsoft.com/office/drawing/2010/main" Requires="a14">
+      <mc:AlternateContent xmlns:mc="http://schemas.openxmlformats.org/markup-compatibility/2006" xmlns:a14="http://schemas.microsoft.com/office/drawing/2010/main">
+        <mc:Choice Requires="a14">
           <p:sp>
             <p:nvSpPr>
               <p:cNvPr id="2" name="Textfeld 1">
@@ -27412,7 +27412,7 @@
             </p:txBody>
           </p:sp>
         </mc:Choice>
-        <mc:Fallback>
+        <mc:Fallback xmlns="">
           <p:sp>
             <p:nvSpPr>
               <p:cNvPr id="2" name="Textfeld 1">
@@ -28712,8 +28712,8 @@
             </a:fontRef>
           </p:style>
         </p:sp>
-        <mc:AlternateContent xmlns:mc="http://schemas.openxmlformats.org/markup-compatibility/2006">
-          <mc:Choice xmlns:a14="http://schemas.microsoft.com/office/drawing/2010/main" Requires="a14">
+        <mc:AlternateContent xmlns:mc="http://schemas.openxmlformats.org/markup-compatibility/2006" xmlns:a14="http://schemas.microsoft.com/office/drawing/2010/main">
+          <mc:Choice Requires="a14">
             <p:sp>
               <p:nvSpPr>
                 <p:cNvPr id="24" name="Rechteck: abgerundete Ecken 4">
@@ -28867,7 +28867,7 @@
               </p:txBody>
             </p:sp>
           </mc:Choice>
-          <mc:Fallback>
+          <mc:Fallback xmlns="">
             <p:sp>
               <p:nvSpPr>
                 <p:cNvPr id="24" name="Rechteck: abgerundete Ecken 4">

</xml_diff>

<commit_message>
new folder for zip-submission
</commit_message>
<xml_diff>
--- a/reports/TeamLab-presentation.pptx
+++ b/reports/TeamLab-presentation.pptx
@@ -1257,7 +1257,7 @@
   <dgm:whole/>
   <dgm:extLst>
     <a:ext uri="http://schemas.microsoft.com/office/drawing/2008/diagram">
-      <dsp:dataModelExt xmlns:dsp="http://schemas.microsoft.com/office/drawing/2008/diagram" relId="rId6" minVer="http://schemas.openxmlformats.org/drawingml/2006/diagram"/>
+      <dsp:dataModelExt xmlns:dsp="http://schemas.microsoft.com/office/drawing/2008/diagram" relId="rId7" minVer="http://schemas.openxmlformats.org/drawingml/2006/diagram"/>
     </a:ext>
   </dgm:extLst>
 </dgm:dataModel>
@@ -2957,7 +2957,7 @@
           <a:p>
             <a:fld id="{322CBE9C-AAEB-46BF-9047-18B3831519BE}" type="datetimeFigureOut">
               <a:rPr lang="de-DE" smtClean="0"/>
-              <a:t>06.06.2021</a:t>
+              <a:t>07.06.2021</a:t>
             </a:fld>
             <a:endParaRPr lang="de-DE"/>
           </a:p>
@@ -27856,7 +27856,7 @@
         </p:xfrm>
         <a:graphic>
           <a:graphicData uri="http://schemas.openxmlformats.org/drawingml/2006/diagram">
-            <dgm:relIds xmlns:dgm="http://schemas.openxmlformats.org/drawingml/2006/diagram" xmlns:r="http://schemas.openxmlformats.org/officeDocument/2006/relationships" r:dm="rId2" r:lo="rId3" r:qs="rId4" r:cs="rId5"/>
+            <dgm:relIds xmlns:dgm="http://schemas.openxmlformats.org/drawingml/2006/diagram" xmlns:r="http://schemas.openxmlformats.org/officeDocument/2006/relationships" r:dm="rId3" r:lo="rId4" r:qs="rId5" r:cs="rId6"/>
           </a:graphicData>
         </a:graphic>
       </p:graphicFrame>
@@ -28891,7 +28891,7 @@
                   <a:avLst/>
                 </a:prstGeom>
                 <a:blipFill>
-                  <a:blip r:embed="rId7"/>
+                  <a:blip r:embed="rId8"/>
                   <a:stretch>
                     <a:fillRect l="-820"/>
                   </a:stretch>
@@ -28914,6 +28914,9 @@
         </mc:AlternateContent>
       </p:grpSp>
     </p:spTree>
+    <p:custDataLst>
+      <p:tags r:id="rId1"/>
+    </p:custDataLst>
     <p:extLst>
       <p:ext uri="{BB962C8B-B14F-4D97-AF65-F5344CB8AC3E}">
         <p14:creationId xmlns:p14="http://schemas.microsoft.com/office/powerpoint/2010/main" val="3417434709"/>
@@ -29334,7 +29337,7 @@
           <p:nvPr/>
         </p:nvPicPr>
         <p:blipFill>
-          <a:blip r:embed="rId2">
+          <a:blip r:embed="rId3">
             <a:extLst>
               <a:ext uri="{28A0092B-C50C-407E-A947-70E740481C1C}">
                 <a14:useLocalDpi xmlns:a14="http://schemas.microsoft.com/office/drawing/2010/main" val="0"/>
@@ -29526,6 +29529,9 @@
         </p:txBody>
       </p:sp>
     </p:spTree>
+    <p:custDataLst>
+      <p:tags r:id="rId1"/>
+    </p:custDataLst>
     <p:extLst>
       <p:ext uri="{BB962C8B-B14F-4D97-AF65-F5344CB8AC3E}">
         <p14:creationId xmlns:p14="http://schemas.microsoft.com/office/powerpoint/2010/main" val="2266496902"/>
@@ -29988,6 +29994,9 @@
         </p:txBody>
       </p:sp>
     </p:spTree>
+    <p:custDataLst>
+      <p:tags r:id="rId1"/>
+    </p:custDataLst>
     <p:extLst>
       <p:ext uri="{BB962C8B-B14F-4D97-AF65-F5344CB8AC3E}">
         <p14:creationId xmlns:p14="http://schemas.microsoft.com/office/powerpoint/2010/main" val="2699207316"/>
@@ -30555,6 +30564,9 @@
         </p:txBody>
       </p:sp>
     </p:spTree>
+    <p:custDataLst>
+      <p:tags r:id="rId1"/>
+    </p:custDataLst>
     <p:extLst>
       <p:ext uri="{BB962C8B-B14F-4D97-AF65-F5344CB8AC3E}">
         <p14:creationId xmlns:p14="http://schemas.microsoft.com/office/powerpoint/2010/main" val="3416307102"/>
@@ -30786,6 +30798,30 @@
     </p:tnLst>
   </p:timing>
 </p:sld>
+</file>
+
+<file path=ppt/tags/tag1.xml><?xml version="1.0" encoding="utf-8"?>
+<p:tagLst xmlns:a="http://schemas.openxmlformats.org/drawingml/2006/main" xmlns:r="http://schemas.openxmlformats.org/officeDocument/2006/relationships" xmlns:p="http://schemas.openxmlformats.org/presentationml/2006/main">
+  <p:tag name="TIMING" val="|7.8|2|2.5|2.3|6"/>
+</p:tagLst>
+</file>
+
+<file path=ppt/tags/tag2.xml><?xml version="1.0" encoding="utf-8"?>
+<p:tagLst xmlns:a="http://schemas.openxmlformats.org/drawingml/2006/main" xmlns:r="http://schemas.openxmlformats.org/officeDocument/2006/relationships" xmlns:p="http://schemas.openxmlformats.org/presentationml/2006/main">
+  <p:tag name="TIMING" val="|8.7|7.6"/>
+</p:tagLst>
+</file>
+
+<file path=ppt/tags/tag3.xml><?xml version="1.0" encoding="utf-8"?>
+<p:tagLst xmlns:a="http://schemas.openxmlformats.org/drawingml/2006/main" xmlns:r="http://schemas.openxmlformats.org/officeDocument/2006/relationships" xmlns:p="http://schemas.openxmlformats.org/presentationml/2006/main">
+  <p:tag name="TIMING" val="|5.1|12.6|16.5"/>
+</p:tagLst>
+</file>
+
+<file path=ppt/tags/tag4.xml><?xml version="1.0" encoding="utf-8"?>
+<p:tagLst xmlns:a="http://schemas.openxmlformats.org/drawingml/2006/main" xmlns:r="http://schemas.openxmlformats.org/officeDocument/2006/relationships" xmlns:p="http://schemas.openxmlformats.org/presentationml/2006/main">
+  <p:tag name="TIMING" val="|6|10.7"/>
+</p:tagLst>
 </file>
 
 <file path=ppt/theme/theme1.xml><?xml version="1.0" encoding="utf-8"?>

</xml_diff>

<commit_message>
all presentation vids and updated slides
</commit_message>
<xml_diff>
--- a/reports/TeamLab-presentation.pptx
+++ b/reports/TeamLab-presentation.pptx
@@ -4392,6 +4392,217 @@
           <a:bodyPr/>
           <a:lstStyle/>
           <a:p>
+            <a:r>
+              <a:rPr lang="de-DE" dirty="0" err="1"/>
+              <a:t>We</a:t>
+            </a:r>
+            <a:r>
+              <a:rPr lang="de-DE" dirty="0"/>
+              <a:t> </a:t>
+            </a:r>
+            <a:r>
+              <a:rPr lang="de-DE" dirty="0" err="1"/>
+              <a:t>extend</a:t>
+            </a:r>
+            <a:r>
+              <a:rPr lang="de-DE" dirty="0"/>
+              <a:t> </a:t>
+            </a:r>
+            <a:r>
+              <a:rPr lang="de-DE" dirty="0" err="1"/>
+              <a:t>the</a:t>
+            </a:r>
+            <a:r>
+              <a:rPr lang="de-DE" dirty="0"/>
+              <a:t> </a:t>
+            </a:r>
+            <a:r>
+              <a:rPr lang="de-DE" dirty="0" err="1"/>
+              <a:t>features</a:t>
+            </a:r>
+            <a:r>
+              <a:rPr lang="de-DE" dirty="0"/>
+              <a:t> </a:t>
+            </a:r>
+            <a:r>
+              <a:rPr lang="de-DE" dirty="0" err="1"/>
+              <a:t>to</a:t>
+            </a:r>
+            <a:r>
+              <a:rPr lang="de-DE" dirty="0"/>
+              <a:t> </a:t>
+            </a:r>
+            <a:r>
+              <a:rPr lang="de-DE" dirty="0" err="1"/>
+              <a:t>literary</a:t>
+            </a:r>
+            <a:r>
+              <a:rPr lang="de-DE" dirty="0"/>
+              <a:t> </a:t>
+            </a:r>
+            <a:r>
+              <a:rPr lang="de-DE" dirty="0" err="1"/>
+              <a:t>devices</a:t>
+            </a:r>
+            <a:endParaRPr lang="de-DE" dirty="0"/>
+          </a:p>
+          <a:p>
+            <a:pPr marL="171450" indent="-171450">
+              <a:buFontTx/>
+              <a:buChar char="-"/>
+            </a:pPr>
+            <a:r>
+              <a:rPr lang="de-DE" dirty="0" err="1"/>
+              <a:t>Because</a:t>
+            </a:r>
+            <a:r>
+              <a:rPr lang="de-DE" dirty="0"/>
+              <a:t> </a:t>
+            </a:r>
+            <a:r>
+              <a:rPr lang="de-DE" dirty="0" err="1"/>
+              <a:t>these</a:t>
+            </a:r>
+            <a:r>
+              <a:rPr lang="de-DE" dirty="0"/>
+              <a:t> </a:t>
+            </a:r>
+            <a:r>
+              <a:rPr lang="de-DE" dirty="0" err="1"/>
+              <a:t>features</a:t>
+            </a:r>
+            <a:r>
+              <a:rPr lang="de-DE" dirty="0"/>
+              <a:t> </a:t>
+            </a:r>
+            <a:r>
+              <a:rPr lang="de-DE" dirty="0" err="1"/>
+              <a:t>have</a:t>
+            </a:r>
+            <a:r>
+              <a:rPr lang="de-DE" dirty="0"/>
+              <a:t> </a:t>
+            </a:r>
+            <a:r>
+              <a:rPr lang="de-DE" dirty="0" err="1"/>
+              <a:t>less</a:t>
+            </a:r>
+            <a:r>
+              <a:rPr lang="de-DE" dirty="0"/>
+              <a:t> </a:t>
+            </a:r>
+            <a:r>
+              <a:rPr lang="de-DE" dirty="0" err="1"/>
+              <a:t>variation</a:t>
+            </a:r>
+            <a:r>
+              <a:rPr lang="de-DE" dirty="0"/>
+              <a:t> </a:t>
+            </a:r>
+            <a:r>
+              <a:rPr lang="de-DE" dirty="0" err="1"/>
+              <a:t>we</a:t>
+            </a:r>
+            <a:r>
+              <a:rPr lang="de-DE" dirty="0"/>
+              <a:t> will also </a:t>
+            </a:r>
+            <a:r>
+              <a:rPr lang="de-DE" dirty="0" err="1"/>
+              <a:t>look</a:t>
+            </a:r>
+            <a:r>
+              <a:rPr lang="de-DE" dirty="0"/>
+              <a:t> at non-linear </a:t>
+            </a:r>
+            <a:r>
+              <a:rPr lang="de-DE" dirty="0" err="1"/>
+              <a:t>classification</a:t>
+            </a:r>
+            <a:endParaRPr lang="en-GB" dirty="0"/>
+          </a:p>
+        </p:txBody>
+      </p:sp>
+      <p:sp>
+        <p:nvSpPr>
+          <p:cNvPr id="4" name="Foliennummernplatzhalter 3"/>
+          <p:cNvSpPr>
+            <a:spLocks noGrp="1"/>
+          </p:cNvSpPr>
+          <p:nvPr>
+            <p:ph type="sldNum" sz="quarter" idx="5"/>
+          </p:nvPr>
+        </p:nvSpPr>
+        <p:spPr/>
+        <p:txBody>
+          <a:bodyPr/>
+          <a:lstStyle/>
+          <a:p>
+            <a:fld id="{5D32D79F-5F1C-4022-A95E-5F41D14F0F12}" type="slidenum">
+              <a:rPr lang="de-DE" smtClean="0"/>
+              <a:t>9</a:t>
+            </a:fld>
+            <a:endParaRPr lang="de-DE"/>
+          </a:p>
+        </p:txBody>
+      </p:sp>
+    </p:spTree>
+    <p:extLst>
+      <p:ext uri="{BB962C8B-B14F-4D97-AF65-F5344CB8AC3E}">
+        <p14:creationId xmlns:p14="http://schemas.microsoft.com/office/powerpoint/2010/main" val="3833485316"/>
+      </p:ext>
+    </p:extLst>
+  </p:cSld>
+  <p:clrMapOvr>
+    <a:masterClrMapping/>
+  </p:clrMapOvr>
+</p:notes>
+</file>
+
+<file path=ppt/notesSlides/notesSlide6.xml><?xml version="1.0" encoding="utf-8"?>
+<p:notes xmlns:a="http://schemas.openxmlformats.org/drawingml/2006/main" xmlns:r="http://schemas.openxmlformats.org/officeDocument/2006/relationships" xmlns:p="http://schemas.openxmlformats.org/presentationml/2006/main">
+  <p:cSld>
+    <p:spTree>
+      <p:nvGrpSpPr>
+        <p:cNvPr id="1" name=""/>
+        <p:cNvGrpSpPr/>
+        <p:nvPr/>
+      </p:nvGrpSpPr>
+      <p:grpSpPr>
+        <a:xfrm>
+          <a:off x="0" y="0"/>
+          <a:ext cx="0" cy="0"/>
+          <a:chOff x="0" y="0"/>
+          <a:chExt cx="0" cy="0"/>
+        </a:xfrm>
+      </p:grpSpPr>
+      <p:sp>
+        <p:nvSpPr>
+          <p:cNvPr id="2" name="Folienbildplatzhalter 1"/>
+          <p:cNvSpPr>
+            <a:spLocks noGrp="1" noRot="1" noChangeAspect="1"/>
+          </p:cNvSpPr>
+          <p:nvPr>
+            <p:ph type="sldImg"/>
+          </p:nvPr>
+        </p:nvSpPr>
+        <p:spPr/>
+      </p:sp>
+      <p:sp>
+        <p:nvSpPr>
+          <p:cNvPr id="3" name="Notizenplatzhalter 2"/>
+          <p:cNvSpPr>
+            <a:spLocks noGrp="1"/>
+          </p:cNvSpPr>
+          <p:nvPr>
+            <p:ph type="body" idx="1"/>
+          </p:nvPr>
+        </p:nvSpPr>
+        <p:spPr/>
+        <p:txBody>
+          <a:bodyPr/>
+          <a:lstStyle/>
+          <a:p>
             <a:endParaRPr lang="en-GB" dirty="0"/>
           </a:p>
         </p:txBody>
@@ -30438,69 +30649,152 @@
           <a:lstStyle/>
           <a:p>
             <a:r>
-              <a:rPr lang="de-DE" dirty="0">
+              <a:rPr lang="de-DE" sz="2000" dirty="0">
                 <a:latin typeface="+mj-lt"/>
               </a:rPr>
-              <a:t>Goal</a:t>
-            </a:r>
-            <a:endParaRPr lang="en-GB" dirty="0">
+              <a:t>Research Question</a:t>
+            </a:r>
+            <a:endParaRPr lang="en-GB" sz="2000" dirty="0">
               <a:latin typeface="+mj-lt"/>
             </a:endParaRPr>
           </a:p>
           <a:p>
-            <a:pPr lvl="1"/>
-            <a:r>
-              <a:rPr lang="en-GB" dirty="0">
+            <a:pPr lvl="1">
+              <a:buFont typeface="Webdings" panose="05030102010509060703" pitchFamily="18" charset="2"/>
+              <a:buChar char="s"/>
+            </a:pPr>
+            <a:r>
+              <a:rPr lang="en-GB" sz="2000" dirty="0">
                 <a:latin typeface="+mj-lt"/>
               </a:rPr>
-              <a:t>Classifier that is especially good for poems</a:t>
-            </a:r>
-          </a:p>
-          <a:p>
-            <a:pPr marL="234943" lvl="1" indent="0">
-              <a:buNone/>
+              <a:t>Which features are inherent to poetry writers</a:t>
+            </a:r>
+          </a:p>
+          <a:p>
+            <a:pPr lvl="1">
+              <a:buFont typeface="Webdings" panose="05030102010509060703" pitchFamily="18" charset="2"/>
+              <a:buChar char="s"/>
             </a:pPr>
-            <a:endParaRPr lang="en-GB" dirty="0">
+            <a:r>
+              <a:rPr lang="en-GB" sz="2000" dirty="0">
+                <a:latin typeface="+mj-lt"/>
+              </a:rPr>
+              <a:t>Are there inter-dependencies between the features </a:t>
+            </a:r>
+          </a:p>
+          <a:p>
+            <a:pPr lvl="1">
+              <a:buFont typeface="Webdings" panose="05030102010509060703" pitchFamily="18" charset="2"/>
+              <a:buChar char="s"/>
+            </a:pPr>
+            <a:endParaRPr lang="en-GB" sz="2000" dirty="0">
               <a:latin typeface="+mj-lt"/>
             </a:endParaRPr>
           </a:p>
           <a:p>
             <a:r>
-              <a:rPr lang="en-GB" dirty="0">
+              <a:rPr lang="en-GB" sz="2000" dirty="0">
                 <a:latin typeface="+mj-lt"/>
               </a:rPr>
-              <a:t>Approaches</a:t>
+              <a:t>Advanced method</a:t>
             </a:r>
           </a:p>
           <a:p>
             <a:pPr lvl="1"/>
             <a:r>
-              <a:rPr lang="en-GB" dirty="0">
+              <a:rPr lang="en-GB" sz="2000" dirty="0">
                 <a:latin typeface="+mj-lt"/>
               </a:rPr>
-              <a:t>Architecture (</a:t>
-            </a:r>
-            <a:r>
-              <a:rPr lang="en-GB" dirty="0" err="1">
+              <a:t>Extending the features		</a:t>
+            </a:r>
+            <a:r>
+              <a:rPr lang="en-GB" sz="2000" dirty="0">
+                <a:sym typeface="Wingdings" panose="05000000000000000000" pitchFamily="2" charset="2"/>
+              </a:rPr>
+              <a:t> </a:t>
+            </a:r>
+            <a:r>
+              <a:rPr lang="en-GB" sz="2000" dirty="0">
+                <a:latin typeface="+mj-lt"/>
+                <a:sym typeface="Wingdings" panose="05000000000000000000" pitchFamily="2" charset="2"/>
+              </a:rPr>
+              <a:t>until 07/05</a:t>
+            </a:r>
+            <a:endParaRPr lang="en-GB" sz="2000" dirty="0">
+              <a:latin typeface="+mj-lt"/>
+            </a:endParaRPr>
+          </a:p>
+          <a:p>
+            <a:pPr lvl="2"/>
+            <a:r>
+              <a:rPr lang="en-GB" sz="2000" dirty="0">
                 <a:latin typeface="+mj-lt"/>
               </a:rPr>
-              <a:t>MaxEnt</a:t>
-            </a:r>
-            <a:r>
-              <a:rPr lang="en-GB" dirty="0">
+              <a:t>Number of stanzas and verses	</a:t>
+            </a:r>
+            <a:r>
+              <a:rPr lang="en-GB" sz="2000" dirty="0">
+                <a:latin typeface="+mj-lt"/>
+                <a:sym typeface="Wingdings" panose="05000000000000000000" pitchFamily="2" charset="2"/>
+              </a:rPr>
+              <a:t> Katrin</a:t>
+            </a:r>
+            <a:endParaRPr lang="en-GB" sz="2000" dirty="0">
+              <a:latin typeface="+mj-lt"/>
+            </a:endParaRPr>
+          </a:p>
+          <a:p>
+            <a:pPr lvl="2"/>
+            <a:r>
+              <a:rPr lang="en-GB" sz="2000" dirty="0">
                 <a:latin typeface="+mj-lt"/>
               </a:rPr>
-              <a:t> vs. NN vs. ...) </a:t>
-            </a:r>
+              <a:t>Rhyming and rhyme schemes	</a:t>
+            </a:r>
+            <a:r>
+              <a:rPr lang="en-GB" sz="2000" dirty="0">
+                <a:latin typeface="+mj-lt"/>
+                <a:sym typeface="Wingdings" panose="05000000000000000000" pitchFamily="2" charset="2"/>
+              </a:rPr>
+              <a:t> Carlotta</a:t>
+            </a:r>
+            <a:endParaRPr lang="en-GB" sz="2000" dirty="0">
+              <a:latin typeface="+mj-lt"/>
+            </a:endParaRPr>
           </a:p>
           <a:p>
             <a:pPr lvl="1"/>
             <a:r>
-              <a:rPr lang="en-GB" dirty="0">
+              <a:rPr lang="en-GB" sz="2000" dirty="0">
                 <a:latin typeface="+mj-lt"/>
               </a:rPr>
-              <a:t>Features (stanzas/verses/rhymes/...)</a:t>
-            </a:r>
+              <a:t>Non-linear model for sparse features and interaction</a:t>
+            </a:r>
+          </a:p>
+          <a:p>
+            <a:pPr lvl="2"/>
+            <a:r>
+              <a:rPr lang="en-GB" sz="2000" dirty="0">
+                <a:latin typeface="+mj-lt"/>
+              </a:rPr>
+              <a:t>Multi-layer NN			</a:t>
+            </a:r>
+            <a:r>
+              <a:rPr lang="en-GB" sz="2000" dirty="0">
+                <a:sym typeface="Wingdings" panose="05000000000000000000" pitchFamily="2" charset="2"/>
+              </a:rPr>
+              <a:t> </a:t>
+            </a:r>
+            <a:r>
+              <a:rPr lang="en-GB" sz="2000" dirty="0">
+                <a:latin typeface="+mj-lt"/>
+                <a:sym typeface="Wingdings" panose="05000000000000000000" pitchFamily="2" charset="2"/>
+              </a:rPr>
+              <a:t>until 07/12</a:t>
+            </a:r>
+            <a:endParaRPr lang="en-GB" sz="2000" dirty="0">
+              <a:latin typeface="+mj-lt"/>
+            </a:endParaRPr>
           </a:p>
         </p:txBody>
       </p:sp>
@@ -30658,33 +30952,15 @@
                                   </p:childTnLst>
                                 </p:cTn>
                               </p:par>
-                            </p:childTnLst>
-                          </p:cTn>
-                        </p:par>
-                      </p:childTnLst>
-                    </p:cTn>
-                  </p:par>
-                  <p:par>
-                    <p:cTn id="9" fill="hold">
-                      <p:stCondLst>
-                        <p:cond delay="indefinite"/>
-                      </p:stCondLst>
-                      <p:childTnLst>
-                        <p:par>
-                          <p:cTn id="10" fill="hold">
-                            <p:stCondLst>
-                              <p:cond delay="0"/>
-                            </p:stCondLst>
-                            <p:childTnLst>
                               <p:par>
-                                <p:cTn id="11" presetID="1" presetClass="entr" presetSubtype="0" fill="hold" nodeType="clickEffect">
+                                <p:cTn id="9" presetID="1" presetClass="entr" presetSubtype="0" fill="hold" nodeType="withEffect">
                                   <p:stCondLst>
                                     <p:cond delay="0"/>
                                   </p:stCondLst>
                                   <p:childTnLst>
                                     <p:set>
                                       <p:cBhvr>
-                                        <p:cTn id="12" dur="1" fill="hold">
+                                        <p:cTn id="10" dur="1" fill="hold">
                                           <p:stCondLst>
                                             <p:cond delay="0"/>
                                           </p:stCondLst>
@@ -30692,7 +30968,7 @@
                                         <p:tgtEl>
                                           <p:spTgt spid="4">
                                             <p:txEl>
-                                              <p:pRg st="3" end="3"/>
+                                              <p:pRg st="2" end="2"/>
                                             </p:txEl>
                                           </p:spTgt>
                                         </p:tgtEl>
@@ -30707,8 +30983,26 @@
                                   </p:childTnLst>
                                 </p:cTn>
                               </p:par>
+                            </p:childTnLst>
+                          </p:cTn>
+                        </p:par>
+                      </p:childTnLst>
+                    </p:cTn>
+                  </p:par>
+                  <p:par>
+                    <p:cTn id="11" fill="hold">
+                      <p:stCondLst>
+                        <p:cond delay="indefinite"/>
+                      </p:stCondLst>
+                      <p:childTnLst>
+                        <p:par>
+                          <p:cTn id="12" fill="hold">
+                            <p:stCondLst>
+                              <p:cond delay="0"/>
+                            </p:stCondLst>
+                            <p:childTnLst>
                               <p:par>
-                                <p:cTn id="13" presetID="1" presetClass="entr" presetSubtype="0" fill="hold" nodeType="withEffect">
+                                <p:cTn id="13" presetID="1" presetClass="entr" presetSubtype="0" fill="hold" nodeType="clickEffect">
                                   <p:stCondLst>
                                     <p:cond delay="0"/>
                                   </p:stCondLst>
@@ -30738,15 +31032,33 @@
                                   </p:childTnLst>
                                 </p:cTn>
                               </p:par>
+                            </p:childTnLst>
+                          </p:cTn>
+                        </p:par>
+                      </p:childTnLst>
+                    </p:cTn>
+                  </p:par>
+                  <p:par>
+                    <p:cTn id="15" fill="hold">
+                      <p:stCondLst>
+                        <p:cond delay="indefinite"/>
+                      </p:stCondLst>
+                      <p:childTnLst>
+                        <p:par>
+                          <p:cTn id="16" fill="hold">
+                            <p:stCondLst>
+                              <p:cond delay="0"/>
+                            </p:stCondLst>
+                            <p:childTnLst>
                               <p:par>
-                                <p:cTn id="15" presetID="1" presetClass="entr" presetSubtype="0" fill="hold" nodeType="withEffect">
+                                <p:cTn id="17" presetID="1" presetClass="entr" presetSubtype="0" fill="hold" nodeType="clickEffect">
                                   <p:stCondLst>
                                     <p:cond delay="0"/>
                                   </p:stCondLst>
                                   <p:childTnLst>
                                     <p:set>
                                       <p:cBhvr>
-                                        <p:cTn id="16" dur="1" fill="hold">
+                                        <p:cTn id="18" dur="1" fill="hold">
                                           <p:stCondLst>
                                             <p:cond delay="0"/>
                                           </p:stCondLst>
@@ -30755,6 +31067,148 @@
                                           <p:spTgt spid="4">
                                             <p:txEl>
                                               <p:pRg st="5" end="5"/>
+                                            </p:txEl>
+                                          </p:spTgt>
+                                        </p:tgtEl>
+                                        <p:attrNameLst>
+                                          <p:attrName>style.visibility</p:attrName>
+                                        </p:attrNameLst>
+                                      </p:cBhvr>
+                                      <p:to>
+                                        <p:strVal val="visible"/>
+                                      </p:to>
+                                    </p:set>
+                                  </p:childTnLst>
+                                </p:cTn>
+                              </p:par>
+                              <p:par>
+                                <p:cTn id="19" presetID="1" presetClass="entr" presetSubtype="0" fill="hold" nodeType="withEffect">
+                                  <p:stCondLst>
+                                    <p:cond delay="0"/>
+                                  </p:stCondLst>
+                                  <p:childTnLst>
+                                    <p:set>
+                                      <p:cBhvr>
+                                        <p:cTn id="20" dur="1" fill="hold">
+                                          <p:stCondLst>
+                                            <p:cond delay="0"/>
+                                          </p:stCondLst>
+                                        </p:cTn>
+                                        <p:tgtEl>
+                                          <p:spTgt spid="4">
+                                            <p:txEl>
+                                              <p:pRg st="6" end="6"/>
+                                            </p:txEl>
+                                          </p:spTgt>
+                                        </p:tgtEl>
+                                        <p:attrNameLst>
+                                          <p:attrName>style.visibility</p:attrName>
+                                        </p:attrNameLst>
+                                      </p:cBhvr>
+                                      <p:to>
+                                        <p:strVal val="visible"/>
+                                      </p:to>
+                                    </p:set>
+                                  </p:childTnLst>
+                                </p:cTn>
+                              </p:par>
+                              <p:par>
+                                <p:cTn id="21" presetID="1" presetClass="entr" presetSubtype="0" fill="hold" nodeType="withEffect">
+                                  <p:stCondLst>
+                                    <p:cond delay="0"/>
+                                  </p:stCondLst>
+                                  <p:childTnLst>
+                                    <p:set>
+                                      <p:cBhvr>
+                                        <p:cTn id="22" dur="1" fill="hold">
+                                          <p:stCondLst>
+                                            <p:cond delay="0"/>
+                                          </p:stCondLst>
+                                        </p:cTn>
+                                        <p:tgtEl>
+                                          <p:spTgt spid="4">
+                                            <p:txEl>
+                                              <p:pRg st="7" end="7"/>
+                                            </p:txEl>
+                                          </p:spTgt>
+                                        </p:tgtEl>
+                                        <p:attrNameLst>
+                                          <p:attrName>style.visibility</p:attrName>
+                                        </p:attrNameLst>
+                                      </p:cBhvr>
+                                      <p:to>
+                                        <p:strVal val="visible"/>
+                                      </p:to>
+                                    </p:set>
+                                  </p:childTnLst>
+                                </p:cTn>
+                              </p:par>
+                            </p:childTnLst>
+                          </p:cTn>
+                        </p:par>
+                      </p:childTnLst>
+                    </p:cTn>
+                  </p:par>
+                  <p:par>
+                    <p:cTn id="23" fill="hold">
+                      <p:stCondLst>
+                        <p:cond delay="indefinite"/>
+                      </p:stCondLst>
+                      <p:childTnLst>
+                        <p:par>
+                          <p:cTn id="24" fill="hold">
+                            <p:stCondLst>
+                              <p:cond delay="0"/>
+                            </p:stCondLst>
+                            <p:childTnLst>
+                              <p:par>
+                                <p:cTn id="25" presetID="1" presetClass="entr" presetSubtype="0" fill="hold" nodeType="clickEffect">
+                                  <p:stCondLst>
+                                    <p:cond delay="0"/>
+                                  </p:stCondLst>
+                                  <p:childTnLst>
+                                    <p:set>
+                                      <p:cBhvr>
+                                        <p:cTn id="26" dur="1" fill="hold">
+                                          <p:stCondLst>
+                                            <p:cond delay="0"/>
+                                          </p:stCondLst>
+                                        </p:cTn>
+                                        <p:tgtEl>
+                                          <p:spTgt spid="4">
+                                            <p:txEl>
+                                              <p:pRg st="8" end="8"/>
+                                            </p:txEl>
+                                          </p:spTgt>
+                                        </p:tgtEl>
+                                        <p:attrNameLst>
+                                          <p:attrName>style.visibility</p:attrName>
+                                        </p:attrNameLst>
+                                      </p:cBhvr>
+                                      <p:to>
+                                        <p:strVal val="visible"/>
+                                      </p:to>
+                                    </p:set>
+                                  </p:childTnLst>
+                                </p:cTn>
+                              </p:par>
+                              <p:par>
+                                <p:cTn id="27" presetID="1" presetClass="entr" presetSubtype="0" fill="hold" nodeType="withEffect">
+                                  <p:stCondLst>
+                                    <p:cond delay="0"/>
+                                  </p:stCondLst>
+                                  <p:childTnLst>
+                                    <p:set>
+                                      <p:cBhvr>
+                                        <p:cTn id="28" dur="1" fill="hold">
+                                          <p:stCondLst>
+                                            <p:cond delay="0"/>
+                                          </p:stCondLst>
+                                        </p:cTn>
+                                        <p:tgtEl>
+                                          <p:spTgt spid="4">
+                                            <p:txEl>
+                                              <p:pRg st="9" end="9"/>
                                             </p:txEl>
                                           </p:spTgt>
                                         </p:tgtEl>

</xml_diff>